<commit_message>
bug fish, output results.
</commit_message>
<xml_diff>
--- a/Summary/20201118_RDM_HW_rotation_update.pptx
+++ b/Summary/20201118_RDM_HW_rotation_update.pptx
@@ -860,32 +860,32 @@
           <a:p>
             <a:r>
               <a:rPr lang="en-US" dirty="0"/>
-              <a:t>Chi squared test looks better behaved for expected proportion</a:t>
-            </a:r>
+              <a:t>Sum up p-values for more extreme cases, i.e., fewer homozygotes</a:t>
+            </a:r>
+          </a:p>
+          <a:p>
+            <a:endParaRPr lang="en-US" dirty="0"/>
           </a:p>
           <a:p>
             <a:r>
               <a:rPr lang="en-US" dirty="0"/>
-              <a:t>For s = 0, look at genotype count of sample size of {500, 1000}</a:t>
+              <a:t>One-sided (fewer homozygotes)</a:t>
+            </a:r>
+          </a:p>
+          <a:p>
+            <a:r>
+              <a:rPr lang="en-US" dirty="0"/>
+              <a:t>One-sided (more homozygotes)</a:t>
+            </a:r>
+          </a:p>
+          <a:p>
+            <a:r>
+              <a:rPr lang="en-US" dirty="0"/>
+              <a:t>Two-sided (every more extreme case, i.e., lower p-value)</a:t>
             </a:r>
           </a:p>
           <a:p>
             <a:endParaRPr lang="en-US" dirty="0"/>
-          </a:p>
-          <a:p>
-            <a:r>
-              <a:rPr lang="en-US" dirty="0"/>
-              <a:t>Consider doing 200 50 bp chromosomes, to reduce LD.</a:t>
-            </a:r>
-          </a:p>
-          <a:p>
-            <a:endParaRPr lang="en-US" dirty="0"/>
-          </a:p>
-          <a:p>
-            <a:r>
-              <a:rPr lang="en-US" dirty="0"/>
-              <a:t>Look to see if low p-values are clustered together.</a:t>
-            </a:r>
           </a:p>
         </p:txBody>
       </p:sp>
@@ -906,7 +906,7 @@
           <a:p>
             <a:fld id="{9D984E8B-8157-4976-ABDF-6DA2CAC3440F}" type="slidenum">
               <a:rPr lang="en-US" smtClean="0"/>
-              <a:t>19</a:t>
+              <a:t>7</a:t>
             </a:fld>
             <a:endParaRPr lang="en-US"/>
           </a:p>
@@ -915,7 +915,7 @@
     </p:spTree>
     <p:extLst>
       <p:ext uri="{BB962C8B-B14F-4D97-AF65-F5344CB8AC3E}">
-        <p14:creationId xmlns:p14="http://schemas.microsoft.com/office/powerpoint/2010/main" val="3435191990"/>
+        <p14:creationId xmlns:p14="http://schemas.microsoft.com/office/powerpoint/2010/main" val="1413621173"/>
       </p:ext>
     </p:extLst>
   </p:cSld>
@@ -969,7 +969,34 @@
           <a:bodyPr/>
           <a:lstStyle/>
           <a:p>
+            <a:r>
+              <a:rPr lang="en-US" dirty="0"/>
+              <a:t>Chi squared test looks better behaved for expected proportion</a:t>
+            </a:r>
+          </a:p>
+          <a:p>
+            <a:r>
+              <a:rPr lang="en-US" dirty="0"/>
+              <a:t>For s = 0, look at genotype count of sample size of {500, 1000}</a:t>
+            </a:r>
+          </a:p>
+          <a:p>
             <a:endParaRPr lang="en-US" dirty="0"/>
+          </a:p>
+          <a:p>
+            <a:r>
+              <a:rPr lang="en-US" dirty="0"/>
+              <a:t>Consider doing 200 50 bp chromosomes, to reduce LD.</a:t>
+            </a:r>
+          </a:p>
+          <a:p>
+            <a:endParaRPr lang="en-US" dirty="0"/>
+          </a:p>
+          <a:p>
+            <a:r>
+              <a:rPr lang="en-US" dirty="0"/>
+              <a:t>Look to see if low p-values are clustered together.</a:t>
+            </a:r>
           </a:p>
         </p:txBody>
       </p:sp>
@@ -990,7 +1017,7 @@
           <a:p>
             <a:fld id="{9D984E8B-8157-4976-ABDF-6DA2CAC3440F}" type="slidenum">
               <a:rPr lang="en-US" smtClean="0"/>
-              <a:t>20</a:t>
+              <a:t>19</a:t>
             </a:fld>
             <a:endParaRPr lang="en-US"/>
           </a:p>
@@ -999,7 +1026,7 @@
     </p:spTree>
     <p:extLst>
       <p:ext uri="{BB962C8B-B14F-4D97-AF65-F5344CB8AC3E}">
-        <p14:creationId xmlns:p14="http://schemas.microsoft.com/office/powerpoint/2010/main" val="489197700"/>
+        <p14:creationId xmlns:p14="http://schemas.microsoft.com/office/powerpoint/2010/main" val="3435191990"/>
       </p:ext>
     </p:extLst>
   </p:cSld>
@@ -1074,7 +1101,7 @@
           <a:p>
             <a:fld id="{9D984E8B-8157-4976-ABDF-6DA2CAC3440F}" type="slidenum">
               <a:rPr lang="en-US" smtClean="0"/>
-              <a:t>21</a:t>
+              <a:t>20</a:t>
             </a:fld>
             <a:endParaRPr lang="en-US"/>
           </a:p>
@@ -1083,7 +1110,7 @@
     </p:spTree>
     <p:extLst>
       <p:ext uri="{BB962C8B-B14F-4D97-AF65-F5344CB8AC3E}">
-        <p14:creationId xmlns:p14="http://schemas.microsoft.com/office/powerpoint/2010/main" val="1487106180"/>
+        <p14:creationId xmlns:p14="http://schemas.microsoft.com/office/powerpoint/2010/main" val="489197700"/>
       </p:ext>
     </p:extLst>
   </p:cSld>
@@ -1158,6 +1185,90 @@
           <a:p>
             <a:fld id="{9D984E8B-8157-4976-ABDF-6DA2CAC3440F}" type="slidenum">
               <a:rPr lang="en-US" smtClean="0"/>
+              <a:t>21</a:t>
+            </a:fld>
+            <a:endParaRPr lang="en-US"/>
+          </a:p>
+        </p:txBody>
+      </p:sp>
+    </p:spTree>
+    <p:extLst>
+      <p:ext uri="{BB962C8B-B14F-4D97-AF65-F5344CB8AC3E}">
+        <p14:creationId xmlns:p14="http://schemas.microsoft.com/office/powerpoint/2010/main" val="1487106180"/>
+      </p:ext>
+    </p:extLst>
+  </p:cSld>
+  <p:clrMapOvr>
+    <a:masterClrMapping/>
+  </p:clrMapOvr>
+</p:notes>
+</file>
+
+<file path=ppt/notesSlides/notesSlide8.xml><?xml version="1.0" encoding="utf-8"?>
+<p:notes xmlns:a="http://schemas.openxmlformats.org/drawingml/2006/main" xmlns:r="http://schemas.openxmlformats.org/officeDocument/2006/relationships" xmlns:p="http://schemas.openxmlformats.org/presentationml/2006/main">
+  <p:cSld>
+    <p:spTree>
+      <p:nvGrpSpPr>
+        <p:cNvPr id="1" name=""/>
+        <p:cNvGrpSpPr/>
+        <p:nvPr/>
+      </p:nvGrpSpPr>
+      <p:grpSpPr>
+        <a:xfrm>
+          <a:off x="0" y="0"/>
+          <a:ext cx="0" cy="0"/>
+          <a:chOff x="0" y="0"/>
+          <a:chExt cx="0" cy="0"/>
+        </a:xfrm>
+      </p:grpSpPr>
+      <p:sp>
+        <p:nvSpPr>
+          <p:cNvPr id="2" name="Slide Image Placeholder 1"/>
+          <p:cNvSpPr>
+            <a:spLocks noGrp="1" noRot="1" noChangeAspect="1"/>
+          </p:cNvSpPr>
+          <p:nvPr>
+            <p:ph type="sldImg"/>
+          </p:nvPr>
+        </p:nvSpPr>
+        <p:spPr/>
+      </p:sp>
+      <p:sp>
+        <p:nvSpPr>
+          <p:cNvPr id="3" name="Notes Placeholder 2"/>
+          <p:cNvSpPr>
+            <a:spLocks noGrp="1"/>
+          </p:cNvSpPr>
+          <p:nvPr>
+            <p:ph type="body" idx="1"/>
+          </p:nvPr>
+        </p:nvSpPr>
+        <p:spPr/>
+        <p:txBody>
+          <a:bodyPr/>
+          <a:lstStyle/>
+          <a:p>
+            <a:endParaRPr lang="en-US" dirty="0"/>
+          </a:p>
+        </p:txBody>
+      </p:sp>
+      <p:sp>
+        <p:nvSpPr>
+          <p:cNvPr id="4" name="Slide Number Placeholder 3"/>
+          <p:cNvSpPr>
+            <a:spLocks noGrp="1"/>
+          </p:cNvSpPr>
+          <p:nvPr>
+            <p:ph type="sldNum" sz="quarter" idx="5"/>
+          </p:nvPr>
+        </p:nvSpPr>
+        <p:spPr/>
+        <p:txBody>
+          <a:bodyPr/>
+          <a:lstStyle/>
+          <a:p>
+            <a:fld id="{9D984E8B-8157-4976-ABDF-6DA2CAC3440F}" type="slidenum">
+              <a:rPr lang="en-US" smtClean="0"/>
               <a:t>22</a:t>
             </a:fld>
             <a:endParaRPr lang="en-US"/>
@@ -1177,7 +1288,7 @@
 </p:notes>
 </file>
 
-<file path=ppt/notesSlides/notesSlide8.xml><?xml version="1.0" encoding="utf-8"?>
+<file path=ppt/notesSlides/notesSlide9.xml><?xml version="1.0" encoding="utf-8"?>
 <p:notes xmlns:a="http://schemas.openxmlformats.org/drawingml/2006/main" xmlns:r="http://schemas.openxmlformats.org/officeDocument/2006/relationships" xmlns:p="http://schemas.openxmlformats.org/presentationml/2006/main">
   <p:cSld>
     <p:spTree>
@@ -6039,7 +6150,7 @@
           <a:p>
             <a:r>
               <a:rPr lang="en-US" dirty="0"/>
-              <a:t>Boxplots (s = 0)</a:t>
+              <a:t>Boxplots (s = 0), Fishers</a:t>
             </a:r>
           </a:p>
         </p:txBody>
@@ -6059,7 +6170,7 @@
         <p:spPr>
           <a:xfrm>
             <a:off x="838200" y="1690688"/>
-            <a:ext cx="715260" cy="369332"/>
+            <a:ext cx="1213794" cy="369332"/>
           </a:xfrm>
           <a:prstGeom prst="rect">
             <a:avLst/>
@@ -6074,7 +6185,7 @@
           <a:p>
             <a:r>
               <a:rPr lang="en-US" dirty="0"/>
-              <a:t>Chi^2</a:t>
+              <a:t>100 x 100b</a:t>
             </a:r>
           </a:p>
         </p:txBody>
@@ -6094,7 +6205,7 @@
         <p:spPr>
           <a:xfrm>
             <a:off x="6624484" y="1690688"/>
-            <a:ext cx="894156" cy="369332"/>
+            <a:ext cx="1096775" cy="369332"/>
           </a:xfrm>
           <a:prstGeom prst="rect">
             <a:avLst/>
@@ -6109,17 +6220,17 @@
           <a:p>
             <a:r>
               <a:rPr lang="en-US" dirty="0"/>
-              <a:t>Fisher’s</a:t>
+              <a:t>400 x 25b</a:t>
             </a:r>
           </a:p>
         </p:txBody>
       </p:sp>
       <p:pic>
         <p:nvPicPr>
-          <p:cNvPr id="4" name="Picture 3" descr="Chart, box and whisker chart&#10;&#10;Description automatically generated">
+          <p:cNvPr id="8" name="Picture 7" descr="Chart, box and whisker chart&#10;&#10;Description automatically generated">
             <a:extLst>
               <a:ext uri="{FF2B5EF4-FFF2-40B4-BE49-F238E27FC236}">
-                <a16:creationId xmlns:a16="http://schemas.microsoft.com/office/drawing/2014/main" id="{674DB094-E87D-4D88-844D-5CB738C56443}"/>
+                <a16:creationId xmlns:a16="http://schemas.microsoft.com/office/drawing/2014/main" id="{8CADEE50-F9CD-44E5-A884-0AA5990C1D7B}"/>
               </a:ext>
             </a:extLst>
           </p:cNvPr>
@@ -6142,7 +6253,7 @@
         </p:blipFill>
         <p:spPr>
           <a:xfrm>
-            <a:off x="0" y="1997049"/>
+            <a:off x="6096000" y="2060020"/>
             <a:ext cx="5919109" cy="3931920"/>
           </a:xfrm>
           <a:prstGeom prst="rect">
@@ -6152,10 +6263,10 @@
       </p:pic>
       <p:pic>
         <p:nvPicPr>
-          <p:cNvPr id="8" name="Picture 7" descr="Chart, box and whisker chart&#10;&#10;Description automatically generated">
+          <p:cNvPr id="3" name="Picture 2" descr="Chart, box and whisker chart&#10;&#10;Description automatically generated">
             <a:extLst>
               <a:ext uri="{FF2B5EF4-FFF2-40B4-BE49-F238E27FC236}">
-                <a16:creationId xmlns:a16="http://schemas.microsoft.com/office/drawing/2014/main" id="{8CADEE50-F9CD-44E5-A884-0AA5990C1D7B}"/>
+                <a16:creationId xmlns:a16="http://schemas.microsoft.com/office/drawing/2014/main" id="{3351DB47-AC53-4228-899F-806D31C7FCC6}"/>
               </a:ext>
             </a:extLst>
           </p:cNvPr>
@@ -6178,8 +6289,8 @@
         </p:blipFill>
         <p:spPr>
           <a:xfrm>
-            <a:off x="6096000" y="2060020"/>
-            <a:ext cx="5919109" cy="3931920"/>
+            <a:off x="70338" y="2069959"/>
+            <a:ext cx="5919110" cy="3931920"/>
           </a:xfrm>
           <a:prstGeom prst="rect">
             <a:avLst/>
@@ -6259,7 +6370,7 @@
         <p:spPr>
           <a:xfrm>
             <a:off x="838200" y="1690688"/>
-            <a:ext cx="1963743" cy="369332"/>
+            <a:ext cx="1213794" cy="369332"/>
           </a:xfrm>
           <a:prstGeom prst="rect">
             <a:avLst/>
@@ -6274,7 +6385,7 @@
           <a:p>
             <a:r>
               <a:rPr lang="en-US" dirty="0"/>
-              <a:t>Without singletons</a:t>
+              <a:t>100 x 100b</a:t>
             </a:r>
           </a:p>
         </p:txBody>
@@ -6294,7 +6405,7 @@
         <p:spPr>
           <a:xfrm>
             <a:off x="6624484" y="1690688"/>
-            <a:ext cx="1643142" cy="369332"/>
+            <a:ext cx="1096775" cy="369332"/>
           </a:xfrm>
           <a:prstGeom prst="rect">
             <a:avLst/>
@@ -6309,17 +6420,17 @@
           <a:p>
             <a:r>
               <a:rPr lang="en-US" dirty="0"/>
-              <a:t>With singletons</a:t>
+              <a:t>400 x 25b</a:t>
             </a:r>
           </a:p>
         </p:txBody>
       </p:sp>
       <p:pic>
         <p:nvPicPr>
-          <p:cNvPr id="13" name="Picture 12" descr="Chart, box and whisker chart&#10;&#10;Description automatically generated">
+          <p:cNvPr id="3" name="Picture 2" descr="Chart, box and whisker chart&#10;&#10;Description automatically generated">
             <a:extLst>
               <a:ext uri="{FF2B5EF4-FFF2-40B4-BE49-F238E27FC236}">
-                <a16:creationId xmlns:a16="http://schemas.microsoft.com/office/drawing/2014/main" id="{4B8F9A01-649D-4C90-A74E-DC7D4CAC7B37}"/>
+                <a16:creationId xmlns:a16="http://schemas.microsoft.com/office/drawing/2014/main" id="{FA740A8B-8653-47BA-8468-98A9DA9D0532}"/>
               </a:ext>
             </a:extLst>
           </p:cNvPr>
@@ -6342,8 +6453,8 @@
         </p:blipFill>
         <p:spPr>
           <a:xfrm>
-            <a:off x="190191" y="2465645"/>
-            <a:ext cx="5584240" cy="3709474"/>
+            <a:off x="176890" y="2386987"/>
+            <a:ext cx="5919110" cy="3931920"/>
           </a:xfrm>
           <a:prstGeom prst="rect">
             <a:avLst/>
@@ -6352,10 +6463,10 @@
       </p:pic>
       <p:pic>
         <p:nvPicPr>
-          <p:cNvPr id="15" name="Picture 14" descr="Chart, box and whisker chart&#10;&#10;Description automatically generated">
+          <p:cNvPr id="5" name="Picture 4" descr="Chart, box and whisker chart&#10;&#10;Description automatically generated">
             <a:extLst>
               <a:ext uri="{FF2B5EF4-FFF2-40B4-BE49-F238E27FC236}">
-                <a16:creationId xmlns:a16="http://schemas.microsoft.com/office/drawing/2014/main" id="{61613258-46B7-4274-A0D0-98D68A4D9A30}"/>
+                <a16:creationId xmlns:a16="http://schemas.microsoft.com/office/drawing/2014/main" id="{043E1105-A02F-470B-ADF6-1CB85EE6A5C8}"/>
               </a:ext>
             </a:extLst>
           </p:cNvPr>
@@ -6378,8 +6489,8 @@
         </p:blipFill>
         <p:spPr>
           <a:xfrm>
-            <a:off x="6096000" y="2465645"/>
-            <a:ext cx="5584240" cy="3709474"/>
+            <a:off x="5902732" y="2386987"/>
+            <a:ext cx="5919110" cy="3931920"/>
           </a:xfrm>
           <a:prstGeom prst="rect">
             <a:avLst/>
@@ -6459,7 +6570,7 @@
           <p:nvPr>
             <p:extLst>
               <p:ext uri="{D42A27DB-BD31-4B8C-83A1-F6EECF244321}">
-                <p14:modId xmlns:p14="http://schemas.microsoft.com/office/powerpoint/2010/main" val="836511750"/>
+                <p14:modId xmlns:p14="http://schemas.microsoft.com/office/powerpoint/2010/main" val="1595716508"/>
               </p:ext>
             </p:extLst>
           </p:nvPr>
@@ -7378,11 +7489,14 @@
                     <a:p>
                       <a:pPr algn="r" fontAlgn="b"/>
                       <a:r>
-                        <a:rPr lang="en-US" sz="1600" b="0" i="0" u="none" strike="noStrike">
-                          <a:solidFill>
-                            <a:srgbClr val="000000"/>
-                          </a:solidFill>
-                          <a:effectLst/>
+                        <a:rPr lang="en-US" sz="1600" b="0" i="0" u="none" strike="noStrike" dirty="0">
+                          <a:solidFill>
+                            <a:srgbClr val="000000"/>
+                          </a:solidFill>
+                          <a:effectLst/>
+                          <a:highlight>
+                            <a:srgbClr val="FFFF00"/>
+                          </a:highlight>
                           <a:latin typeface="+mn-lt"/>
                         </a:rPr>
                         <a:t>0.054795</a:t>
@@ -7443,6 +7557,9 @@
                             <a:srgbClr val="000000"/>
                           </a:solidFill>
                           <a:effectLst/>
+                          <a:highlight>
+                            <a:srgbClr val="FFFF00"/>
+                          </a:highlight>
                           <a:latin typeface="+mn-lt"/>
                         </a:rPr>
                         <a:t>0.547945</a:t>
@@ -7516,7 +7633,7 @@
           <p:nvPr>
             <p:extLst>
               <p:ext uri="{D42A27DB-BD31-4B8C-83A1-F6EECF244321}">
-                <p14:modId xmlns:p14="http://schemas.microsoft.com/office/powerpoint/2010/main" val="127687513"/>
+                <p14:modId xmlns:p14="http://schemas.microsoft.com/office/powerpoint/2010/main" val="1174441426"/>
               </p:ext>
             </p:extLst>
           </p:nvPr>
@@ -8416,11 +8533,14 @@
                     <a:p>
                       <a:pPr algn="r" fontAlgn="b"/>
                       <a:r>
-                        <a:rPr lang="en-US" sz="1600" b="0" i="0" u="none" strike="noStrike">
-                          <a:solidFill>
-                            <a:srgbClr val="000000"/>
-                          </a:solidFill>
-                          <a:effectLst/>
+                        <a:rPr lang="en-US" sz="1600" b="0" i="0" u="none" strike="noStrike" dirty="0">
+                          <a:solidFill>
+                            <a:srgbClr val="000000"/>
+                          </a:solidFill>
+                          <a:effectLst/>
+                          <a:highlight>
+                            <a:srgbClr val="FFFF00"/>
+                          </a:highlight>
                           <a:latin typeface="+mn-lt"/>
                         </a:rPr>
                         <a:t>0.054795</a:t>
@@ -8481,6 +8601,9 @@
                             <a:srgbClr val="000000"/>
                           </a:solidFill>
                           <a:effectLst/>
+                          <a:highlight>
+                            <a:srgbClr val="FFFF00"/>
+                          </a:highlight>
                           <a:latin typeface="+mn-lt"/>
                         </a:rPr>
                         <a:t>0.547945</a:t>
@@ -15402,6 +15525,38 @@
           <a:p>
             <a:r>
               <a:rPr lang="en-US" dirty="0"/>
+              <a:t>Compute one-sided t-test (&lt;= x homozygotes)</a:t>
+            </a:r>
+          </a:p>
+          <a:p>
+            <a:r>
+              <a:rPr lang="en-US" dirty="0"/>
+              <a:t>Compute one-sided t-test (&gt;= x homozygotes)</a:t>
+            </a:r>
+          </a:p>
+          <a:p>
+            <a:r>
+              <a:rPr lang="en-US" dirty="0"/>
+              <a:t>Computed two-sided test</a:t>
+            </a:r>
+          </a:p>
+          <a:p>
+            <a:pPr lvl="1"/>
+            <a:r>
+              <a:rPr lang="en-US" dirty="0"/>
+              <a:t>Find pr(X=x)</a:t>
+            </a:r>
+          </a:p>
+          <a:p>
+            <a:pPr lvl="1"/>
+            <a:r>
+              <a:rPr lang="en-US" dirty="0"/>
+              <a:t>Sum all probabilities &lt;= x, i.e., the more extreme cases.</a:t>
+            </a:r>
+          </a:p>
+          <a:p>
+            <a:r>
+              <a:rPr lang="en-US" dirty="0"/>
               <a:t>Bin p-values for boxplot</a:t>
             </a:r>
           </a:p>
@@ -16082,7 +16237,7 @@
                 <a:latin typeface="Yu Gothic" panose="020B0400000000000000" pitchFamily="34" charset="-128"/>
                 <a:ea typeface="Yu Gothic" panose="020B0400000000000000" pitchFamily="34" charset="-128"/>
               </a:rPr>
-              <a:t>Sort of… </a:t>
+              <a:t>Sort of … </a:t>
             </a:r>
           </a:p>
           <a:p>
@@ -16376,8 +16531,8 @@
           </a:p>
         </p:txBody>
       </p:sp>
-      <mc:AlternateContent xmlns:mc="http://schemas.openxmlformats.org/markup-compatibility/2006">
-        <mc:Choice xmlns:a14="http://schemas.microsoft.com/office/drawing/2010/main" Requires="a14">
+      <mc:AlternateContent xmlns:mc="http://schemas.openxmlformats.org/markup-compatibility/2006" xmlns:a14="http://schemas.microsoft.com/office/drawing/2010/main">
+        <mc:Choice Requires="a14">
           <p:sp>
             <p:nvSpPr>
               <p:cNvPr id="3" name="Content Placeholder 2">
@@ -16725,37 +16880,7 @@
                             <a:rPr lang="en-US" b="0" i="1" smtClean="0">
                               <a:latin typeface="Cambria Math" panose="02040503050406030204" pitchFamily="18" charset="0"/>
                             </a:rPr>
-                            <m:t>1000</m:t>
-                          </m:r>
-                          <m:r>
-                            <a:rPr lang="en-US" b="0" i="1" smtClean="0">
-                              <a:latin typeface="Cambria Math" panose="02040503050406030204" pitchFamily="18" charset="0"/>
-                            </a:rPr>
-                            <m:t>!</m:t>
-                          </m:r>
-                          <m:r>
-                            <a:rPr lang="en-US" b="0" i="1" smtClean="0">
-                              <a:latin typeface="Cambria Math" panose="02040503050406030204" pitchFamily="18" charset="0"/>
-                            </a:rPr>
-                            <m:t>1851</m:t>
-                          </m:r>
-                          <m:r>
-                            <a:rPr lang="en-US" b="0" i="1" smtClean="0">
-                              <a:latin typeface="Cambria Math" panose="02040503050406030204" pitchFamily="18" charset="0"/>
-                            </a:rPr>
-                            <m:t>!</m:t>
-                          </m:r>
-                          <m:r>
-                            <a:rPr lang="en-US" b="0" i="1" smtClean="0">
-                              <a:latin typeface="Cambria Math" panose="02040503050406030204" pitchFamily="18" charset="0"/>
-                            </a:rPr>
-                            <m:t>149</m:t>
-                          </m:r>
-                          <m:r>
-                            <a:rPr lang="en-US" b="0" i="1" smtClean="0">
-                              <a:latin typeface="Cambria Math" panose="02040503050406030204" pitchFamily="18" charset="0"/>
-                            </a:rPr>
-                            <m:t>!</m:t>
+                            <m:t>1000!1851!149!</m:t>
                           </m:r>
                           <m:sSup>
                             <m:sSupPr>
@@ -16794,37 +16919,7 @@
                             <a:rPr lang="en-US" b="0" i="1" smtClean="0">
                               <a:latin typeface="Cambria Math" panose="02040503050406030204" pitchFamily="18" charset="0"/>
                             </a:rPr>
-                            <m:t>868</m:t>
-                          </m:r>
-                          <m:r>
-                            <a:rPr lang="en-US" b="0" i="1" smtClean="0">
-                              <a:latin typeface="Cambria Math" panose="02040503050406030204" pitchFamily="18" charset="0"/>
-                            </a:rPr>
-                            <m:t>!</m:t>
-                          </m:r>
-                          <m:r>
-                            <a:rPr lang="en-US" b="0" i="1" smtClean="0">
-                              <a:latin typeface="Cambria Math" panose="02040503050406030204" pitchFamily="18" charset="0"/>
-                            </a:rPr>
-                            <m:t>115</m:t>
-                          </m:r>
-                          <m:r>
-                            <a:rPr lang="en-US" b="0" i="1" smtClean="0">
-                              <a:latin typeface="Cambria Math" panose="02040503050406030204" pitchFamily="18" charset="0"/>
-                            </a:rPr>
-                            <m:t>!</m:t>
-                          </m:r>
-                          <m:r>
-                            <a:rPr lang="en-US" b="0" i="1" smtClean="0">
-                              <a:latin typeface="Cambria Math" panose="02040503050406030204" pitchFamily="18" charset="0"/>
-                            </a:rPr>
-                            <m:t>17</m:t>
-                          </m:r>
-                          <m:r>
-                            <a:rPr lang="en-US" b="0" i="1" smtClean="0">
-                              <a:latin typeface="Cambria Math" panose="02040503050406030204" pitchFamily="18" charset="0"/>
-                            </a:rPr>
-                            <m:t>!</m:t>
+                            <m:t>868!115!17!</m:t>
                           </m:r>
                           <m:d>
                             <m:dPr>
@@ -16839,13 +16934,7 @@
                                 <a:rPr lang="en-US" b="0" i="1" smtClean="0">
                                   <a:latin typeface="Cambria Math" panose="02040503050406030204" pitchFamily="18" charset="0"/>
                                 </a:rPr>
-                                <m:t>2</m:t>
-                              </m:r>
-                              <m:r>
-                                <a:rPr lang="en-US" b="0" i="1" smtClean="0">
-                                  <a:latin typeface="Cambria Math" panose="02040503050406030204" pitchFamily="18" charset="0"/>
-                                </a:rPr>
-                                <m:t>000</m:t>
+                                <m:t>2000</m:t>
                               </m:r>
                             </m:e>
                           </m:d>
@@ -16918,7 +17007,7 @@
                           <m:nor/>
                         </m:rPr>
                         <a:rPr lang="en-US" dirty="0"/>
-                        <m:t>-06</m:t>
+                        <m:t>−06</m:t>
                       </m:r>
                     </m:oMath>
                   </m:oMathPara>
@@ -16940,7 +17029,7 @@
             </p:txBody>
           </p:sp>
         </mc:Choice>
-        <mc:Fallback>
+        <mc:Fallback xmlns="">
           <p:sp>
             <p:nvSpPr>
               <p:cNvPr id="3" name="Content Placeholder 2">

</xml_diff>